<commit_message>
neurons to build a function
</commit_message>
<xml_diff>
--- a/FromBiologyToComputers.pptx
+++ b/FromBiologyToComputers.pptx
@@ -5,7 +5,7 @@
     <p:sldMasterId id="2147483648" r:id="rId1"/>
   </p:sldMasterIdLst>
   <p:notesMasterIdLst>
-    <p:notesMasterId r:id="rId9"/>
+    <p:notesMasterId r:id="rId10"/>
   </p:notesMasterIdLst>
   <p:sldIdLst>
     <p:sldId id="256" r:id="rId2"/>
@@ -15,6 +15,7 @@
     <p:sldId id="265" r:id="rId6"/>
     <p:sldId id="266" r:id="rId7"/>
     <p:sldId id="270" r:id="rId8"/>
+    <p:sldId id="314" r:id="rId9"/>
   </p:sldIdLst>
   <p:sldSz cx="12192000" cy="6858000"/>
   <p:notesSz cx="6858000" cy="9144000"/>
@@ -129,6 +130,7 @@
             <p14:sldId id="265"/>
             <p14:sldId id="266"/>
             <p14:sldId id="270"/>
+            <p14:sldId id="314"/>
           </p14:sldIdLst>
         </p14:section>
       </p14:sectionLst>
@@ -10458,6 +10460,733 @@
 </p:sld>
 </file>
 
+<file path=ppt/slides/slide8.xml><?xml version="1.0" encoding="utf-8"?>
+<p:sld xmlns:a="http://schemas.openxmlformats.org/drawingml/2006/main" xmlns:r="http://schemas.openxmlformats.org/officeDocument/2006/relationships" xmlns:p="http://schemas.openxmlformats.org/presentationml/2006/main">
+  <p:cSld>
+    <p:spTree>
+      <p:nvGrpSpPr>
+        <p:cNvPr id="1" name=""/>
+        <p:cNvGrpSpPr/>
+        <p:nvPr/>
+      </p:nvGrpSpPr>
+      <p:grpSpPr>
+        <a:xfrm>
+          <a:off x="0" y="0"/>
+          <a:ext cx="0" cy="0"/>
+          <a:chOff x="0" y="0"/>
+          <a:chExt cx="0" cy="0"/>
+        </a:xfrm>
+      </p:grpSpPr>
+      <p:sp>
+        <p:nvSpPr>
+          <p:cNvPr id="2" name="Title 1">
+            <a:extLst>
+              <a:ext uri="{FF2B5EF4-FFF2-40B4-BE49-F238E27FC236}">
+                <a16:creationId xmlns:a16="http://schemas.microsoft.com/office/drawing/2014/main" id="{16746A89-C831-4D70-7DCF-E3F313BEC275}"/>
+              </a:ext>
+            </a:extLst>
+          </p:cNvPr>
+          <p:cNvSpPr>
+            <a:spLocks noGrp="1"/>
+          </p:cNvSpPr>
+          <p:nvPr>
+            <p:ph type="title"/>
+          </p:nvPr>
+        </p:nvSpPr>
+        <p:spPr/>
+        <p:txBody>
+          <a:bodyPr/>
+          <a:lstStyle/>
+          <a:p>
+            <a:r>
+              <a:rPr lang="en-US" dirty="0"/>
+              <a:t>Neurons to build a function</a:t>
+            </a:r>
+          </a:p>
+        </p:txBody>
+      </p:sp>
+      <p:sp>
+        <p:nvSpPr>
+          <p:cNvPr id="4" name="TextBox 3">
+            <a:extLst>
+              <a:ext uri="{FF2B5EF4-FFF2-40B4-BE49-F238E27FC236}">
+                <a16:creationId xmlns:a16="http://schemas.microsoft.com/office/drawing/2014/main" id="{77A15CFF-E118-88AE-EBEE-3EBCCE9B4651}"/>
+              </a:ext>
+            </a:extLst>
+          </p:cNvPr>
+          <p:cNvSpPr txBox="1"/>
+          <p:nvPr/>
+        </p:nvSpPr>
+        <p:spPr>
+          <a:xfrm>
+            <a:off x="1814326" y="3676977"/>
+            <a:ext cx="1103187" cy="523220"/>
+          </a:xfrm>
+          <a:prstGeom prst="rect">
+            <a:avLst/>
+          </a:prstGeom>
+        </p:spPr>
+        <p:style>
+          <a:lnRef idx="2">
+            <a:schemeClr val="accent6">
+              <a:shade val="15000"/>
+            </a:schemeClr>
+          </a:lnRef>
+          <a:fillRef idx="1">
+            <a:schemeClr val="accent6"/>
+          </a:fillRef>
+          <a:effectRef idx="0">
+            <a:schemeClr val="accent6"/>
+          </a:effectRef>
+          <a:fontRef idx="minor">
+            <a:schemeClr val="lt1"/>
+          </a:fontRef>
+        </p:style>
+        <p:txBody>
+          <a:bodyPr wrap="none" rtlCol="0">
+            <a:spAutoFit/>
+          </a:bodyPr>
+          <a:lstStyle/>
+          <a:p>
+            <a:r>
+              <a:rPr lang="en-US" sz="2800" dirty="0"/>
+              <a:t>Inputs</a:t>
+            </a:r>
+          </a:p>
+        </p:txBody>
+      </p:sp>
+      <p:sp>
+        <p:nvSpPr>
+          <p:cNvPr id="5" name="TextBox 4">
+            <a:extLst>
+              <a:ext uri="{FF2B5EF4-FFF2-40B4-BE49-F238E27FC236}">
+                <a16:creationId xmlns:a16="http://schemas.microsoft.com/office/drawing/2014/main" id="{8937DEE5-E92E-BC0B-8AC9-A9FD6CCB2135}"/>
+              </a:ext>
+            </a:extLst>
+          </p:cNvPr>
+          <p:cNvSpPr txBox="1"/>
+          <p:nvPr/>
+        </p:nvSpPr>
+        <p:spPr>
+          <a:xfrm>
+            <a:off x="9153525" y="3676977"/>
+            <a:ext cx="1370888" cy="523220"/>
+          </a:xfrm>
+          <a:prstGeom prst="rect">
+            <a:avLst/>
+          </a:prstGeom>
+        </p:spPr>
+        <p:style>
+          <a:lnRef idx="2">
+            <a:schemeClr val="accent4">
+              <a:shade val="15000"/>
+            </a:schemeClr>
+          </a:lnRef>
+          <a:fillRef idx="1">
+            <a:schemeClr val="accent4"/>
+          </a:fillRef>
+          <a:effectRef idx="0">
+            <a:schemeClr val="accent4"/>
+          </a:effectRef>
+          <a:fontRef idx="minor">
+            <a:schemeClr val="lt1"/>
+          </a:fontRef>
+        </p:style>
+        <p:txBody>
+          <a:bodyPr wrap="none" rtlCol="0">
+            <a:spAutoFit/>
+          </a:bodyPr>
+          <a:lstStyle/>
+          <a:p>
+            <a:r>
+              <a:rPr lang="en-US" sz="2800" dirty="0"/>
+              <a:t>Outputs</a:t>
+            </a:r>
+          </a:p>
+        </p:txBody>
+      </p:sp>
+      <p:grpSp>
+        <p:nvGrpSpPr>
+          <p:cNvPr id="9" name="Group 8">
+            <a:extLst>
+              <a:ext uri="{FF2B5EF4-FFF2-40B4-BE49-F238E27FC236}">
+                <a16:creationId xmlns:a16="http://schemas.microsoft.com/office/drawing/2014/main" id="{109BAAE2-A6FC-8C27-2212-E33507BD5D29}"/>
+              </a:ext>
+            </a:extLst>
+          </p:cNvPr>
+          <p:cNvGrpSpPr/>
+          <p:nvPr/>
+        </p:nvGrpSpPr>
+        <p:grpSpPr>
+          <a:xfrm>
+            <a:off x="3781425" y="2152650"/>
+            <a:ext cx="4629150" cy="3571875"/>
+            <a:chOff x="3781425" y="2152650"/>
+            <a:chExt cx="4629150" cy="3571875"/>
+          </a:xfrm>
+        </p:grpSpPr>
+        <p:sp>
+          <p:nvSpPr>
+            <p:cNvPr id="3" name="Arrow: Right 2">
+              <a:extLst>
+                <a:ext uri="{FF2B5EF4-FFF2-40B4-BE49-F238E27FC236}">
+                  <a16:creationId xmlns:a16="http://schemas.microsoft.com/office/drawing/2014/main" id="{E9192074-782D-531A-6690-D55CCF10E2D4}"/>
+                </a:ext>
+              </a:extLst>
+            </p:cNvPr>
+            <p:cNvSpPr/>
+            <p:nvPr/>
+          </p:nvSpPr>
+          <p:spPr>
+            <a:xfrm>
+              <a:off x="3781425" y="2152650"/>
+              <a:ext cx="4629150" cy="3571875"/>
+            </a:xfrm>
+            <a:prstGeom prst="rightArrow">
+              <a:avLst/>
+            </a:prstGeom>
+          </p:spPr>
+          <p:style>
+            <a:lnRef idx="2">
+              <a:schemeClr val="accent5">
+                <a:shade val="15000"/>
+              </a:schemeClr>
+            </a:lnRef>
+            <a:fillRef idx="1">
+              <a:schemeClr val="accent5"/>
+            </a:fillRef>
+            <a:effectRef idx="0">
+              <a:schemeClr val="accent5"/>
+            </a:effectRef>
+            <a:fontRef idx="minor">
+              <a:schemeClr val="lt1"/>
+            </a:fontRef>
+          </p:style>
+          <p:txBody>
+            <a:bodyPr rtlCol="0" anchor="ctr"/>
+            <a:lstStyle/>
+            <a:p>
+              <a:pPr algn="ctr"/>
+              <a:endParaRPr lang="en-US" dirty="0"/>
+            </a:p>
+          </p:txBody>
+        </p:sp>
+        <p:pic>
+          <p:nvPicPr>
+            <p:cNvPr id="6" name="Picture 5">
+              <a:extLst>
+                <a:ext uri="{FF2B5EF4-FFF2-40B4-BE49-F238E27FC236}">
+                  <a16:creationId xmlns:a16="http://schemas.microsoft.com/office/drawing/2014/main" id="{434C1FF4-ECC3-9285-4A1D-1961128A8330}"/>
+                </a:ext>
+              </a:extLst>
+            </p:cNvPr>
+            <p:cNvPicPr>
+              <a:picLocks noChangeAspect="1"/>
+            </p:cNvPicPr>
+            <p:nvPr/>
+          </p:nvPicPr>
+          <p:blipFill>
+            <a:blip r:embed="rId2"/>
+            <a:stretch>
+              <a:fillRect/>
+            </a:stretch>
+          </p:blipFill>
+          <p:spPr>
+            <a:xfrm>
+              <a:off x="5276850" y="3124200"/>
+              <a:ext cx="1638300" cy="1638300"/>
+            </a:xfrm>
+            <a:prstGeom prst="rect">
+              <a:avLst/>
+            </a:prstGeom>
+          </p:spPr>
+        </p:pic>
+        <p:pic>
+          <p:nvPicPr>
+            <p:cNvPr id="7" name="Picture 6">
+              <a:extLst>
+                <a:ext uri="{FF2B5EF4-FFF2-40B4-BE49-F238E27FC236}">
+                  <a16:creationId xmlns:a16="http://schemas.microsoft.com/office/drawing/2014/main" id="{7F253A94-40E1-8373-92CC-B0888219952E}"/>
+                </a:ext>
+              </a:extLst>
+            </p:cNvPr>
+            <p:cNvPicPr>
+              <a:picLocks noChangeAspect="1"/>
+            </p:cNvPicPr>
+            <p:nvPr/>
+          </p:nvPicPr>
+          <p:blipFill>
+            <a:blip r:embed="rId3"/>
+            <a:stretch>
+              <a:fillRect/>
+            </a:stretch>
+          </p:blipFill>
+          <p:spPr>
+            <a:xfrm>
+              <a:off x="4100399" y="3429000"/>
+              <a:ext cx="1176451" cy="1038855"/>
+            </a:xfrm>
+            <a:prstGeom prst="rect">
+              <a:avLst/>
+            </a:prstGeom>
+          </p:spPr>
+        </p:pic>
+      </p:grpSp>
+      <p:sp>
+        <p:nvSpPr>
+          <p:cNvPr id="10" name="Oval 9">
+            <a:extLst>
+              <a:ext uri="{FF2B5EF4-FFF2-40B4-BE49-F238E27FC236}">
+                <a16:creationId xmlns:a16="http://schemas.microsoft.com/office/drawing/2014/main" id="{170BA194-FF2A-FC4D-4CD7-5196809374C2}"/>
+              </a:ext>
+            </a:extLst>
+          </p:cNvPr>
+          <p:cNvSpPr/>
+          <p:nvPr/>
+        </p:nvSpPr>
+        <p:spPr>
+          <a:xfrm>
+            <a:off x="5379720" y="3232147"/>
+            <a:ext cx="1432560" cy="1432560"/>
+          </a:xfrm>
+          <a:prstGeom prst="ellipse">
+            <a:avLst/>
+          </a:prstGeom>
+        </p:spPr>
+        <p:style>
+          <a:lnRef idx="2">
+            <a:schemeClr val="accent5">
+              <a:shade val="15000"/>
+            </a:schemeClr>
+          </a:lnRef>
+          <a:fillRef idx="1">
+            <a:schemeClr val="accent5"/>
+          </a:fillRef>
+          <a:effectRef idx="0">
+            <a:schemeClr val="accent5"/>
+          </a:effectRef>
+          <a:fontRef idx="minor">
+            <a:schemeClr val="lt1"/>
+          </a:fontRef>
+        </p:style>
+        <p:txBody>
+          <a:bodyPr rtlCol="0" anchor="ctr"/>
+          <a:lstStyle/>
+          <a:p>
+            <a:pPr algn="ctr"/>
+            <a:r>
+              <a:rPr lang="en-US" dirty="0"/>
+              <a:t>Neurons</a:t>
+            </a:r>
+          </a:p>
+        </p:txBody>
+      </p:sp>
+      <p:cxnSp>
+        <p:nvCxnSpPr>
+          <p:cNvPr id="12" name="Straight Connector 11">
+            <a:extLst>
+              <a:ext uri="{FF2B5EF4-FFF2-40B4-BE49-F238E27FC236}">
+                <a16:creationId xmlns:a16="http://schemas.microsoft.com/office/drawing/2014/main" id="{0F3364A7-7896-9A67-9122-8317C195C468}"/>
+              </a:ext>
+            </a:extLst>
+          </p:cNvPr>
+          <p:cNvCxnSpPr>
+            <a:cxnSpLocks/>
+            <a:stCxn id="4" idx="3"/>
+            <a:endCxn id="10" idx="2"/>
+          </p:cNvCxnSpPr>
+          <p:nvPr/>
+        </p:nvCxnSpPr>
+        <p:spPr>
+          <a:xfrm>
+            <a:off x="2917513" y="3938587"/>
+            <a:ext cx="2462207" cy="9840"/>
+          </a:xfrm>
+          <a:prstGeom prst="line">
+            <a:avLst/>
+          </a:prstGeom>
+          <a:ln w="76200">
+            <a:solidFill>
+              <a:schemeClr val="bg1">
+                <a:lumMod val="50000"/>
+              </a:schemeClr>
+            </a:solidFill>
+          </a:ln>
+        </p:spPr>
+        <p:style>
+          <a:lnRef idx="1">
+            <a:schemeClr val="dk1"/>
+          </a:lnRef>
+          <a:fillRef idx="0">
+            <a:schemeClr val="dk1"/>
+          </a:fillRef>
+          <a:effectRef idx="0">
+            <a:schemeClr val="dk1"/>
+          </a:effectRef>
+          <a:fontRef idx="minor">
+            <a:schemeClr val="tx1"/>
+          </a:fontRef>
+        </p:style>
+      </p:cxnSp>
+      <p:cxnSp>
+        <p:nvCxnSpPr>
+          <p:cNvPr id="13" name="Straight Connector 12">
+            <a:extLst>
+              <a:ext uri="{FF2B5EF4-FFF2-40B4-BE49-F238E27FC236}">
+                <a16:creationId xmlns:a16="http://schemas.microsoft.com/office/drawing/2014/main" id="{E4BB34B0-0660-42D1-889E-1EE1BD8C4DBB}"/>
+              </a:ext>
+            </a:extLst>
+          </p:cNvPr>
+          <p:cNvCxnSpPr>
+            <a:cxnSpLocks/>
+            <a:stCxn id="10" idx="6"/>
+            <a:endCxn id="5" idx="1"/>
+          </p:cNvCxnSpPr>
+          <p:nvPr/>
+        </p:nvCxnSpPr>
+        <p:spPr>
+          <a:xfrm flipV="1">
+            <a:off x="6812280" y="3938587"/>
+            <a:ext cx="2341245" cy="9840"/>
+          </a:xfrm>
+          <a:prstGeom prst="line">
+            <a:avLst/>
+          </a:prstGeom>
+          <a:ln w="76200">
+            <a:solidFill>
+              <a:schemeClr val="bg1">
+                <a:lumMod val="50000"/>
+              </a:schemeClr>
+            </a:solidFill>
+          </a:ln>
+        </p:spPr>
+        <p:style>
+          <a:lnRef idx="1">
+            <a:schemeClr val="dk1"/>
+          </a:lnRef>
+          <a:fillRef idx="0">
+            <a:schemeClr val="dk1"/>
+          </a:fillRef>
+          <a:effectRef idx="0">
+            <a:schemeClr val="dk1"/>
+          </a:effectRef>
+          <a:fontRef idx="minor">
+            <a:schemeClr val="tx1"/>
+          </a:fontRef>
+        </p:style>
+      </p:cxnSp>
+    </p:spTree>
+    <p:extLst>
+      <p:ext uri="{BB962C8B-B14F-4D97-AF65-F5344CB8AC3E}">
+        <p14:creationId xmlns:p14="http://schemas.microsoft.com/office/powerpoint/2010/main" val="2717411689"/>
+      </p:ext>
+    </p:extLst>
+  </p:cSld>
+  <p:clrMapOvr>
+    <a:masterClrMapping/>
+  </p:clrMapOvr>
+  <p:timing>
+    <p:tnLst>
+      <p:par>
+        <p:cTn id="1" dur="indefinite" restart="never" nodeType="tmRoot">
+          <p:childTnLst>
+            <p:seq concurrent="1" nextAc="seek">
+              <p:cTn id="2" dur="indefinite" nodeType="mainSeq">
+                <p:childTnLst>
+                  <p:par>
+                    <p:cTn id="3" fill="hold">
+                      <p:stCondLst>
+                        <p:cond delay="indefinite"/>
+                      </p:stCondLst>
+                      <p:childTnLst>
+                        <p:par>
+                          <p:cTn id="4" fill="hold">
+                            <p:stCondLst>
+                              <p:cond delay="0"/>
+                            </p:stCondLst>
+                            <p:childTnLst>
+                              <p:par>
+                                <p:cTn id="5" presetID="10" presetClass="entr" presetSubtype="0" fill="hold" grpId="0" nodeType="clickEffect">
+                                  <p:stCondLst>
+                                    <p:cond delay="0"/>
+                                  </p:stCondLst>
+                                  <p:childTnLst>
+                                    <p:set>
+                                      <p:cBhvr>
+                                        <p:cTn id="6" dur="1" fill="hold">
+                                          <p:stCondLst>
+                                            <p:cond delay="0"/>
+                                          </p:stCondLst>
+                                        </p:cTn>
+                                        <p:tgtEl>
+                                          <p:spTgt spid="4"/>
+                                        </p:tgtEl>
+                                        <p:attrNameLst>
+                                          <p:attrName>style.visibility</p:attrName>
+                                        </p:attrNameLst>
+                                      </p:cBhvr>
+                                      <p:to>
+                                        <p:strVal val="visible"/>
+                                      </p:to>
+                                    </p:set>
+                                    <p:animEffect transition="in" filter="fade">
+                                      <p:cBhvr>
+                                        <p:cTn id="7" dur="500"/>
+                                        <p:tgtEl>
+                                          <p:spTgt spid="4"/>
+                                        </p:tgtEl>
+                                      </p:cBhvr>
+                                    </p:animEffect>
+                                  </p:childTnLst>
+                                </p:cTn>
+                              </p:par>
+                            </p:childTnLst>
+                          </p:cTn>
+                        </p:par>
+                      </p:childTnLst>
+                    </p:cTn>
+                  </p:par>
+                  <p:par>
+                    <p:cTn id="8" fill="hold">
+                      <p:stCondLst>
+                        <p:cond delay="indefinite"/>
+                      </p:stCondLst>
+                      <p:childTnLst>
+                        <p:par>
+                          <p:cTn id="9" fill="hold">
+                            <p:stCondLst>
+                              <p:cond delay="0"/>
+                            </p:stCondLst>
+                            <p:childTnLst>
+                              <p:par>
+                                <p:cTn id="10" presetID="10" presetClass="entr" presetSubtype="0" fill="hold" grpId="0" nodeType="clickEffect">
+                                  <p:stCondLst>
+                                    <p:cond delay="0"/>
+                                  </p:stCondLst>
+                                  <p:childTnLst>
+                                    <p:set>
+                                      <p:cBhvr>
+                                        <p:cTn id="11" dur="1" fill="hold">
+                                          <p:stCondLst>
+                                            <p:cond delay="0"/>
+                                          </p:stCondLst>
+                                        </p:cTn>
+                                        <p:tgtEl>
+                                          <p:spTgt spid="5"/>
+                                        </p:tgtEl>
+                                        <p:attrNameLst>
+                                          <p:attrName>style.visibility</p:attrName>
+                                        </p:attrNameLst>
+                                      </p:cBhvr>
+                                      <p:to>
+                                        <p:strVal val="visible"/>
+                                      </p:to>
+                                    </p:set>
+                                    <p:animEffect transition="in" filter="fade">
+                                      <p:cBhvr>
+                                        <p:cTn id="12" dur="500"/>
+                                        <p:tgtEl>
+                                          <p:spTgt spid="5"/>
+                                        </p:tgtEl>
+                                      </p:cBhvr>
+                                    </p:animEffect>
+                                  </p:childTnLst>
+                                </p:cTn>
+                              </p:par>
+                            </p:childTnLst>
+                          </p:cTn>
+                        </p:par>
+                      </p:childTnLst>
+                    </p:cTn>
+                  </p:par>
+                  <p:par>
+                    <p:cTn id="13" fill="hold">
+                      <p:stCondLst>
+                        <p:cond delay="indefinite"/>
+                      </p:stCondLst>
+                      <p:childTnLst>
+                        <p:par>
+                          <p:cTn id="14" fill="hold">
+                            <p:stCondLst>
+                              <p:cond delay="0"/>
+                            </p:stCondLst>
+                            <p:childTnLst>
+                              <p:par>
+                                <p:cTn id="15" presetID="10" presetClass="exit" presetSubtype="0" fill="hold" nodeType="clickEffect">
+                                  <p:stCondLst>
+                                    <p:cond delay="0"/>
+                                  </p:stCondLst>
+                                  <p:childTnLst>
+                                    <p:animEffect transition="out" filter="fade">
+                                      <p:cBhvr>
+                                        <p:cTn id="16" dur="500"/>
+                                        <p:tgtEl>
+                                          <p:spTgt spid="9"/>
+                                        </p:tgtEl>
+                                      </p:cBhvr>
+                                    </p:animEffect>
+                                    <p:set>
+                                      <p:cBhvr>
+                                        <p:cTn id="17" dur="1" fill="hold">
+                                          <p:stCondLst>
+                                            <p:cond delay="499"/>
+                                          </p:stCondLst>
+                                        </p:cTn>
+                                        <p:tgtEl>
+                                          <p:spTgt spid="9"/>
+                                        </p:tgtEl>
+                                        <p:attrNameLst>
+                                          <p:attrName>style.visibility</p:attrName>
+                                        </p:attrNameLst>
+                                      </p:cBhvr>
+                                      <p:to>
+                                        <p:strVal val="hidden"/>
+                                      </p:to>
+                                    </p:set>
+                                  </p:childTnLst>
+                                </p:cTn>
+                              </p:par>
+                              <p:par>
+                                <p:cTn id="18" presetID="10" presetClass="entr" presetSubtype="0" fill="hold" grpId="0" nodeType="withEffect">
+                                  <p:stCondLst>
+                                    <p:cond delay="0"/>
+                                  </p:stCondLst>
+                                  <p:childTnLst>
+                                    <p:set>
+                                      <p:cBhvr>
+                                        <p:cTn id="19" dur="1" fill="hold">
+                                          <p:stCondLst>
+                                            <p:cond delay="0"/>
+                                          </p:stCondLst>
+                                        </p:cTn>
+                                        <p:tgtEl>
+                                          <p:spTgt spid="10"/>
+                                        </p:tgtEl>
+                                        <p:attrNameLst>
+                                          <p:attrName>style.visibility</p:attrName>
+                                        </p:attrNameLst>
+                                      </p:cBhvr>
+                                      <p:to>
+                                        <p:strVal val="visible"/>
+                                      </p:to>
+                                    </p:set>
+                                    <p:animEffect transition="in" filter="fade">
+                                      <p:cBhvr>
+                                        <p:cTn id="20" dur="500"/>
+                                        <p:tgtEl>
+                                          <p:spTgt spid="10"/>
+                                        </p:tgtEl>
+                                      </p:cBhvr>
+                                    </p:animEffect>
+                                  </p:childTnLst>
+                                </p:cTn>
+                              </p:par>
+                              <p:par>
+                                <p:cTn id="21" presetID="10" presetClass="entr" presetSubtype="0" fill="hold" nodeType="withEffect">
+                                  <p:stCondLst>
+                                    <p:cond delay="0"/>
+                                  </p:stCondLst>
+                                  <p:childTnLst>
+                                    <p:set>
+                                      <p:cBhvr>
+                                        <p:cTn id="22" dur="1" fill="hold">
+                                          <p:stCondLst>
+                                            <p:cond delay="0"/>
+                                          </p:stCondLst>
+                                        </p:cTn>
+                                        <p:tgtEl>
+                                          <p:spTgt spid="12"/>
+                                        </p:tgtEl>
+                                        <p:attrNameLst>
+                                          <p:attrName>style.visibility</p:attrName>
+                                        </p:attrNameLst>
+                                      </p:cBhvr>
+                                      <p:to>
+                                        <p:strVal val="visible"/>
+                                      </p:to>
+                                    </p:set>
+                                    <p:animEffect transition="in" filter="fade">
+                                      <p:cBhvr>
+                                        <p:cTn id="23" dur="500"/>
+                                        <p:tgtEl>
+                                          <p:spTgt spid="12"/>
+                                        </p:tgtEl>
+                                      </p:cBhvr>
+                                    </p:animEffect>
+                                  </p:childTnLst>
+                                </p:cTn>
+                              </p:par>
+                              <p:par>
+                                <p:cTn id="24" presetID="10" presetClass="entr" presetSubtype="0" fill="hold" nodeType="withEffect">
+                                  <p:stCondLst>
+                                    <p:cond delay="0"/>
+                                  </p:stCondLst>
+                                  <p:childTnLst>
+                                    <p:set>
+                                      <p:cBhvr>
+                                        <p:cTn id="25" dur="1" fill="hold">
+                                          <p:stCondLst>
+                                            <p:cond delay="0"/>
+                                          </p:stCondLst>
+                                        </p:cTn>
+                                        <p:tgtEl>
+                                          <p:spTgt spid="13"/>
+                                        </p:tgtEl>
+                                        <p:attrNameLst>
+                                          <p:attrName>style.visibility</p:attrName>
+                                        </p:attrNameLst>
+                                      </p:cBhvr>
+                                      <p:to>
+                                        <p:strVal val="visible"/>
+                                      </p:to>
+                                    </p:set>
+                                    <p:animEffect transition="in" filter="fade">
+                                      <p:cBhvr>
+                                        <p:cTn id="26" dur="500"/>
+                                        <p:tgtEl>
+                                          <p:spTgt spid="13"/>
+                                        </p:tgtEl>
+                                      </p:cBhvr>
+                                    </p:animEffect>
+                                  </p:childTnLst>
+                                </p:cTn>
+                              </p:par>
+                            </p:childTnLst>
+                          </p:cTn>
+                        </p:par>
+                      </p:childTnLst>
+                    </p:cTn>
+                  </p:par>
+                </p:childTnLst>
+              </p:cTn>
+              <p:prevCondLst>
+                <p:cond evt="onPrev" delay="0">
+                  <p:tgtEl>
+                    <p:sldTgt/>
+                  </p:tgtEl>
+                </p:cond>
+              </p:prevCondLst>
+              <p:nextCondLst>
+                <p:cond evt="onNext" delay="0">
+                  <p:tgtEl>
+                    <p:sldTgt/>
+                  </p:tgtEl>
+                </p:cond>
+              </p:nextCondLst>
+            </p:seq>
+          </p:childTnLst>
+        </p:cTn>
+      </p:par>
+    </p:tnLst>
+    <p:bldLst>
+      <p:bldP spid="4" grpId="0" animBg="1"/>
+      <p:bldP spid="5" grpId="0" animBg="1"/>
+      <p:bldP spid="10" grpId="0" animBg="1"/>
+    </p:bldLst>
+  </p:timing>
+</p:sld>
+</file>
+
 <file path=ppt/theme/theme1.xml><?xml version="1.0" encoding="utf-8"?>
 <a:theme xmlns:a="http://schemas.openxmlformats.org/drawingml/2006/main" name="Office Theme">
   <a:themeElements>

</xml_diff>